<commit_message>
ajuste tela de consulta pra atender cliente. Só pesquisa se houver lançamento
</commit_message>
<xml_diff>
--- a/Vence.Input4Edicao/Vence.Input4Edicao/Content/Arquivos/Tutorial.pptx
+++ b/Vence.Input4Edicao/Vence.Input4Edicao/Content/Arquivos/Tutorial.pptx
@@ -19,7 +19,8 @@
     <p:sldId id="287" r:id="rId13"/>
     <p:sldId id="288" r:id="rId14"/>
     <p:sldId id="289" r:id="rId15"/>
-    <p:sldId id="278" r:id="rId16"/>
+    <p:sldId id="290" r:id="rId16"/>
+    <p:sldId id="278" r:id="rId17"/>
   </p:sldIdLst>
   <p:sldSz cx="9144000" cy="6858000" type="screen4x3"/>
   <p:notesSz cx="6858000" cy="9144000"/>
@@ -150,7 +151,7 @@
   </p:defaultTextStyle>
   <p:extLst>
     <p:ext uri="{EFAFB233-063F-42B5-8137-9DF3F51BA10A}">
-      <p15:sldGuideLst xmlns:p15="http://schemas.microsoft.com/office/powerpoint/2012/main" xmlns="">
+      <p15:sldGuideLst xmlns="" xmlns:p15="http://schemas.microsoft.com/office/powerpoint/2012/main">
         <p15:guide id="1" orient="horz" pos="2160">
           <p15:clr>
             <a:srgbClr val="A4A3A4"/>
@@ -299,7 +300,7 @@
             <a:fld id="{58D6B5C3-D02B-4B2B-B8BE-B77FE0E9DE66}" type="datetimeFigureOut">
               <a:rPr lang="pt-BR" smtClean="0"/>
               <a:pPr/>
-              <a:t>24/03/2016</a:t>
+              <a:t>28/03/2016</a:t>
             </a:fld>
             <a:endParaRPr lang="pt-BR"/>
           </a:p>
@@ -351,7 +352,7 @@
     </p:spTree>
     <p:extLst>
       <p:ext uri="{BB962C8B-B14F-4D97-AF65-F5344CB8AC3E}">
-        <p14:creationId xmlns:p14="http://schemas.microsoft.com/office/powerpoint/2010/main" xmlns="" val="2642962379"/>
+        <p14:creationId xmlns="" xmlns:p14="http://schemas.microsoft.com/office/powerpoint/2010/main" val="2642962379"/>
       </p:ext>
     </p:extLst>
   </p:cSld>
@@ -471,7 +472,7 @@
             <a:fld id="{58D6B5C3-D02B-4B2B-B8BE-B77FE0E9DE66}" type="datetimeFigureOut">
               <a:rPr lang="pt-BR" smtClean="0"/>
               <a:pPr/>
-              <a:t>24/03/2016</a:t>
+              <a:t>28/03/2016</a:t>
             </a:fld>
             <a:endParaRPr lang="pt-BR"/>
           </a:p>
@@ -523,7 +524,7 @@
     </p:spTree>
     <p:extLst>
       <p:ext uri="{BB962C8B-B14F-4D97-AF65-F5344CB8AC3E}">
-        <p14:creationId xmlns:p14="http://schemas.microsoft.com/office/powerpoint/2010/main" xmlns="" val="1296099117"/>
+        <p14:creationId xmlns="" xmlns:p14="http://schemas.microsoft.com/office/powerpoint/2010/main" val="1296099117"/>
       </p:ext>
     </p:extLst>
   </p:cSld>
@@ -653,7 +654,7 @@
             <a:fld id="{58D6B5C3-D02B-4B2B-B8BE-B77FE0E9DE66}" type="datetimeFigureOut">
               <a:rPr lang="pt-BR" smtClean="0"/>
               <a:pPr/>
-              <a:t>24/03/2016</a:t>
+              <a:t>28/03/2016</a:t>
             </a:fld>
             <a:endParaRPr lang="pt-BR"/>
           </a:p>
@@ -705,7 +706,7 @@
     </p:spTree>
     <p:extLst>
       <p:ext uri="{BB962C8B-B14F-4D97-AF65-F5344CB8AC3E}">
-        <p14:creationId xmlns:p14="http://schemas.microsoft.com/office/powerpoint/2010/main" xmlns="" val="131343666"/>
+        <p14:creationId xmlns="" xmlns:p14="http://schemas.microsoft.com/office/powerpoint/2010/main" val="131343666"/>
       </p:ext>
     </p:extLst>
   </p:cSld>
@@ -825,7 +826,7 @@
             <a:fld id="{58D6B5C3-D02B-4B2B-B8BE-B77FE0E9DE66}" type="datetimeFigureOut">
               <a:rPr lang="pt-BR" smtClean="0"/>
               <a:pPr/>
-              <a:t>24/03/2016</a:t>
+              <a:t>28/03/2016</a:t>
             </a:fld>
             <a:endParaRPr lang="pt-BR"/>
           </a:p>
@@ -877,7 +878,7 @@
     </p:spTree>
     <p:extLst>
       <p:ext uri="{BB962C8B-B14F-4D97-AF65-F5344CB8AC3E}">
-        <p14:creationId xmlns:p14="http://schemas.microsoft.com/office/powerpoint/2010/main" xmlns="" val="2000232094"/>
+        <p14:creationId xmlns="" xmlns:p14="http://schemas.microsoft.com/office/powerpoint/2010/main" val="2000232094"/>
       </p:ext>
     </p:extLst>
   </p:cSld>
@@ -1073,7 +1074,7 @@
             <a:fld id="{58D6B5C3-D02B-4B2B-B8BE-B77FE0E9DE66}" type="datetimeFigureOut">
               <a:rPr lang="pt-BR" smtClean="0"/>
               <a:pPr/>
-              <a:t>24/03/2016</a:t>
+              <a:t>28/03/2016</a:t>
             </a:fld>
             <a:endParaRPr lang="pt-BR"/>
           </a:p>
@@ -1125,7 +1126,7 @@
     </p:spTree>
     <p:extLst>
       <p:ext uri="{BB962C8B-B14F-4D97-AF65-F5344CB8AC3E}">
-        <p14:creationId xmlns:p14="http://schemas.microsoft.com/office/powerpoint/2010/main" xmlns="" val="2939131465"/>
+        <p14:creationId xmlns="" xmlns:p14="http://schemas.microsoft.com/office/powerpoint/2010/main" val="2939131465"/>
       </p:ext>
     </p:extLst>
   </p:cSld>
@@ -1307,7 +1308,7 @@
             <a:fld id="{58D6B5C3-D02B-4B2B-B8BE-B77FE0E9DE66}" type="datetimeFigureOut">
               <a:rPr lang="pt-BR" smtClean="0"/>
               <a:pPr/>
-              <a:t>24/03/2016</a:t>
+              <a:t>28/03/2016</a:t>
             </a:fld>
             <a:endParaRPr lang="pt-BR"/>
           </a:p>
@@ -1359,7 +1360,7 @@
     </p:spTree>
     <p:extLst>
       <p:ext uri="{BB962C8B-B14F-4D97-AF65-F5344CB8AC3E}">
-        <p14:creationId xmlns:p14="http://schemas.microsoft.com/office/powerpoint/2010/main" xmlns="" val="4213137649"/>
+        <p14:creationId xmlns="" xmlns:p14="http://schemas.microsoft.com/office/powerpoint/2010/main" val="4213137649"/>
       </p:ext>
     </p:extLst>
   </p:cSld>
@@ -1676,7 +1677,7 @@
             <a:fld id="{58D6B5C3-D02B-4B2B-B8BE-B77FE0E9DE66}" type="datetimeFigureOut">
               <a:rPr lang="pt-BR" smtClean="0"/>
               <a:pPr/>
-              <a:t>24/03/2016</a:t>
+              <a:t>28/03/2016</a:t>
             </a:fld>
             <a:endParaRPr lang="pt-BR"/>
           </a:p>
@@ -1728,7 +1729,7 @@
     </p:spTree>
     <p:extLst>
       <p:ext uri="{BB962C8B-B14F-4D97-AF65-F5344CB8AC3E}">
-        <p14:creationId xmlns:p14="http://schemas.microsoft.com/office/powerpoint/2010/main" xmlns="" val="2176694907"/>
+        <p14:creationId xmlns="" xmlns:p14="http://schemas.microsoft.com/office/powerpoint/2010/main" val="2176694907"/>
       </p:ext>
     </p:extLst>
   </p:cSld>
@@ -1796,7 +1797,7 @@
             <a:fld id="{58D6B5C3-D02B-4B2B-B8BE-B77FE0E9DE66}" type="datetimeFigureOut">
               <a:rPr lang="pt-BR" smtClean="0"/>
               <a:pPr/>
-              <a:t>24/03/2016</a:t>
+              <a:t>28/03/2016</a:t>
             </a:fld>
             <a:endParaRPr lang="pt-BR"/>
           </a:p>
@@ -1848,7 +1849,7 @@
     </p:spTree>
     <p:extLst>
       <p:ext uri="{BB962C8B-B14F-4D97-AF65-F5344CB8AC3E}">
-        <p14:creationId xmlns:p14="http://schemas.microsoft.com/office/powerpoint/2010/main" xmlns="" val="3200939363"/>
+        <p14:creationId xmlns="" xmlns:p14="http://schemas.microsoft.com/office/powerpoint/2010/main" val="3200939363"/>
       </p:ext>
     </p:extLst>
   </p:cSld>
@@ -1893,7 +1894,7 @@
             <a:fld id="{58D6B5C3-D02B-4B2B-B8BE-B77FE0E9DE66}" type="datetimeFigureOut">
               <a:rPr lang="pt-BR" smtClean="0"/>
               <a:pPr/>
-              <a:t>24/03/2016</a:t>
+              <a:t>28/03/2016</a:t>
             </a:fld>
             <a:endParaRPr lang="pt-BR"/>
           </a:p>
@@ -1945,7 +1946,7 @@
     </p:spTree>
     <p:extLst>
       <p:ext uri="{BB962C8B-B14F-4D97-AF65-F5344CB8AC3E}">
-        <p14:creationId xmlns:p14="http://schemas.microsoft.com/office/powerpoint/2010/main" xmlns="" val="509016653"/>
+        <p14:creationId xmlns="" xmlns:p14="http://schemas.microsoft.com/office/powerpoint/2010/main" val="509016653"/>
       </p:ext>
     </p:extLst>
   </p:cSld>
@@ -2172,7 +2173,7 @@
             <a:fld id="{58D6B5C3-D02B-4B2B-B8BE-B77FE0E9DE66}" type="datetimeFigureOut">
               <a:rPr lang="pt-BR" smtClean="0"/>
               <a:pPr/>
-              <a:t>24/03/2016</a:t>
+              <a:t>28/03/2016</a:t>
             </a:fld>
             <a:endParaRPr lang="pt-BR"/>
           </a:p>
@@ -2224,7 +2225,7 @@
     </p:spTree>
     <p:extLst>
       <p:ext uri="{BB962C8B-B14F-4D97-AF65-F5344CB8AC3E}">
-        <p14:creationId xmlns:p14="http://schemas.microsoft.com/office/powerpoint/2010/main" xmlns="" val="724758006"/>
+        <p14:creationId xmlns="" xmlns:p14="http://schemas.microsoft.com/office/powerpoint/2010/main" val="724758006"/>
       </p:ext>
     </p:extLst>
   </p:cSld>
@@ -2427,7 +2428,7 @@
             <a:fld id="{58D6B5C3-D02B-4B2B-B8BE-B77FE0E9DE66}" type="datetimeFigureOut">
               <a:rPr lang="pt-BR" smtClean="0"/>
               <a:pPr/>
-              <a:t>24/03/2016</a:t>
+              <a:t>28/03/2016</a:t>
             </a:fld>
             <a:endParaRPr lang="pt-BR"/>
           </a:p>
@@ -2479,7 +2480,7 @@
     </p:spTree>
     <p:extLst>
       <p:ext uri="{BB962C8B-B14F-4D97-AF65-F5344CB8AC3E}">
-        <p14:creationId xmlns:p14="http://schemas.microsoft.com/office/powerpoint/2010/main" xmlns="" val="2599328073"/>
+        <p14:creationId xmlns="" xmlns:p14="http://schemas.microsoft.com/office/powerpoint/2010/main" val="2599328073"/>
       </p:ext>
     </p:extLst>
   </p:cSld>
@@ -2642,7 +2643,7 @@
             <a:fld id="{58D6B5C3-D02B-4B2B-B8BE-B77FE0E9DE66}" type="datetimeFigureOut">
               <a:rPr lang="pt-BR" smtClean="0"/>
               <a:pPr/>
-              <a:t>24/03/2016</a:t>
+              <a:t>28/03/2016</a:t>
             </a:fld>
             <a:endParaRPr lang="pt-BR"/>
           </a:p>
@@ -2740,7 +2741,7 @@
             <a:lum bright="10000"/>
             <a:extLst>
               <a:ext uri="{28A0092B-C50C-407E-A947-70E740481C1C}">
-                <a14:useLocalDpi xmlns:a14="http://schemas.microsoft.com/office/drawing/2010/main" xmlns="" val="0"/>
+                <a14:useLocalDpi xmlns="" xmlns:a14="http://schemas.microsoft.com/office/drawing/2010/main" val="0"/>
               </a:ext>
             </a:extLst>
           </a:blip>
@@ -2763,14 +2764,14 @@
           </a:ln>
           <a:extLst>
             <a:ext uri="{909E8E84-426E-40DD-AFC4-6F175D3DCCD1}">
-              <a14:hiddenFill xmlns:a14="http://schemas.microsoft.com/office/drawing/2010/main" xmlns="">
+              <a14:hiddenFill xmlns="" xmlns:a14="http://schemas.microsoft.com/office/drawing/2010/main">
                 <a:solidFill>
                   <a:srgbClr val="FFFFFF"/>
                 </a:solidFill>
               </a14:hiddenFill>
             </a:ext>
             <a:ext uri="{91240B29-F687-4F45-9708-019B960494DF}">
-              <a14:hiddenLine xmlns:a14="http://schemas.microsoft.com/office/drawing/2010/main" xmlns="" w="9525">
+              <a14:hiddenLine xmlns="" xmlns:a14="http://schemas.microsoft.com/office/drawing/2010/main" w="9525">
                 <a:solidFill>
                   <a:srgbClr val="000000"/>
                 </a:solidFill>
@@ -2794,7 +2795,7 @@
           <a:blip r:embed="rId14" cstate="print">
             <a:extLst>
               <a:ext uri="{28A0092B-C50C-407E-A947-70E740481C1C}">
-                <a14:useLocalDpi xmlns:a14="http://schemas.microsoft.com/office/drawing/2010/main" xmlns="" val="0"/>
+                <a14:useLocalDpi xmlns="" xmlns:a14="http://schemas.microsoft.com/office/drawing/2010/main" val="0"/>
               </a:ext>
             </a:extLst>
           </a:blip>
@@ -2817,14 +2818,14 @@
           </a:ln>
           <a:extLst>
             <a:ext uri="{909E8E84-426E-40DD-AFC4-6F175D3DCCD1}">
-              <a14:hiddenFill xmlns:a14="http://schemas.microsoft.com/office/drawing/2010/main" xmlns="">
+              <a14:hiddenFill xmlns="" xmlns:a14="http://schemas.microsoft.com/office/drawing/2010/main">
                 <a:solidFill>
                   <a:srgbClr val="FFFFFF"/>
                 </a:solidFill>
               </a14:hiddenFill>
             </a:ext>
             <a:ext uri="{91240B29-F687-4F45-9708-019B960494DF}">
-              <a14:hiddenLine xmlns:a14="http://schemas.microsoft.com/office/drawing/2010/main" xmlns="" w="9525">
+              <a14:hiddenLine xmlns="" xmlns:a14="http://schemas.microsoft.com/office/drawing/2010/main" w="9525">
                 <a:solidFill>
                   <a:srgbClr val="000000"/>
                 </a:solidFill>
@@ -2839,7 +2840,7 @@
     </p:spTree>
     <p:extLst>
       <p:ext uri="{BB962C8B-B14F-4D97-AF65-F5344CB8AC3E}">
-        <p14:creationId xmlns:p14="http://schemas.microsoft.com/office/powerpoint/2010/main" xmlns="" val="1433154830"/>
+        <p14:creationId xmlns="" xmlns:p14="http://schemas.microsoft.com/office/powerpoint/2010/main" val="1433154830"/>
       </p:ext>
     </p:extLst>
   </p:cSld>
@@ -3179,14 +3180,14 @@
           </a:ln>
           <a:extLst>
             <a:ext uri="{909E8E84-426E-40DD-AFC4-6F175D3DCCD1}">
-              <a14:hiddenFill xmlns:a14="http://schemas.microsoft.com/office/drawing/2010/main" xmlns="">
+              <a14:hiddenFill xmlns="" xmlns:a14="http://schemas.microsoft.com/office/drawing/2010/main">
                 <a:solidFill>
                   <a:srgbClr val="FFFFFF"/>
                 </a:solidFill>
               </a14:hiddenFill>
             </a:ext>
             <a:ext uri="{91240B29-F687-4F45-9708-019B960494DF}">
-              <a14:hiddenLine xmlns:a14="http://schemas.microsoft.com/office/drawing/2010/main" xmlns="" w="9525">
+              <a14:hiddenLine xmlns="" xmlns:a14="http://schemas.microsoft.com/office/drawing/2010/main" w="9525">
                 <a:solidFill>
                   <a:srgbClr val="000000"/>
                 </a:solidFill>
@@ -3505,11 +3506,7 @@
             </a:r>
             <a:r>
               <a:rPr lang="pt-BR" sz="1200" b="1" baseline="0" dirty="0" err="1" smtClean="0"/>
-              <a:t>C</a:t>
-            </a:r>
-            <a:r>
-              <a:rPr lang="pt-BR" sz="1200" b="1" baseline="0" dirty="0" err="1" smtClean="0"/>
-              <a:t>lick</a:t>
+              <a:t>Click</a:t>
             </a:r>
             <a:r>
               <a:rPr lang="pt-BR" sz="1200" b="1" baseline="0" dirty="0" smtClean="0"/>
@@ -4139,11 +4136,7 @@
           <a:p>
             <a:r>
               <a:rPr lang="pt-BR" sz="2000" b="1" dirty="0" smtClean="0"/>
-              <a:t>Dados </a:t>
-            </a:r>
-            <a:r>
-              <a:rPr lang="pt-BR" sz="2000" b="1" dirty="0" smtClean="0"/>
-              <a:t>salvos para uma turma especifica</a:t>
+              <a:t>Dados salvos para uma turma especifica</a:t>
             </a:r>
             <a:endParaRPr lang="pt-BR" sz="2000" b="1" dirty="0"/>
           </a:p>
@@ -4363,31 +4356,7 @@
           <a:p>
             <a:r>
               <a:rPr lang="pt-BR" sz="2000" b="1" dirty="0" smtClean="0"/>
-              <a:t>Se você precisar corrigir algum dado de lançamento, </a:t>
-            </a:r>
-            <a:r>
-              <a:rPr lang="pt-BR" sz="2000" b="1" dirty="0" smtClean="0"/>
-              <a:t>você  </a:t>
-            </a:r>
-            <a:r>
-              <a:rPr lang="pt-BR" sz="2000" b="1" dirty="0" smtClean="0"/>
-              <a:t>terá </a:t>
-            </a:r>
-            <a:r>
-              <a:rPr lang="pt-BR" sz="2000" b="1" dirty="0" smtClean="0"/>
-              <a:t> que recadastrar </a:t>
-            </a:r>
-            <a:r>
-              <a:rPr lang="pt-BR" sz="2000" b="1" dirty="0" smtClean="0"/>
-              <a:t>tudo novamente </a:t>
-            </a:r>
-            <a:r>
-              <a:rPr lang="pt-BR" sz="2000" b="1" dirty="0" smtClean="0"/>
-              <a:t>e </a:t>
-            </a:r>
-            <a:r>
-              <a:rPr lang="pt-BR" sz="2000" b="1" dirty="0" smtClean="0"/>
-              <a:t>salvar. Assim como na figura abaixo. “Refazer o lançamento”</a:t>
+              <a:t>Se você precisar corrigir algum dado de lançamento, você  terá  que recadastrar tudo novamente e salvar. Assim como na figura abaixo. “Refazer o lançamento”</a:t>
             </a:r>
             <a:endParaRPr lang="pt-BR" sz="2000" b="1" dirty="0"/>
           </a:p>
@@ -4430,15 +4399,7 @@
                   <a:srgbClr val="FF0000"/>
                 </a:solidFill>
               </a:rPr>
-              <a:t>Recadastrando </a:t>
-            </a:r>
-            <a:r>
-              <a:rPr lang="pt-BR" dirty="0" smtClean="0">
-                <a:solidFill>
-                  <a:srgbClr val="FF0000"/>
-                </a:solidFill>
-              </a:rPr>
-              <a:t>novamente!!!</a:t>
+              <a:t>Recadastrando novamente!!!</a:t>
             </a:r>
             <a:endParaRPr lang="pt-BR" dirty="0">
               <a:solidFill>
@@ -4482,6 +4443,347 @@
       </p:grpSpPr>
       <p:sp>
         <p:nvSpPr>
+          <p:cNvPr id="3" name="Título 1"/>
+          <p:cNvSpPr>
+            <a:spLocks noGrp="1"/>
+          </p:cNvSpPr>
+          <p:nvPr>
+            <p:ph type="title"/>
+          </p:nvPr>
+        </p:nvSpPr>
+        <p:spPr>
+          <a:xfrm>
+            <a:off x="628650" y="365126"/>
+            <a:ext cx="7886700" cy="1325563"/>
+          </a:xfrm>
+        </p:spPr>
+        <p:txBody>
+          <a:bodyPr>
+            <a:normAutofit/>
+          </a:bodyPr>
+          <a:lstStyle/>
+          <a:p>
+            <a:pPr algn="ctr"/>
+            <a:r>
+              <a:rPr lang="pt-BR" sz="3600" b="1" dirty="0" smtClean="0">
+                <a:latin typeface="Lucida Sans" pitchFamily="34" charset="0"/>
+                <a:cs typeface="Lucida Sans" pitchFamily="34" charset="0"/>
+              </a:rPr>
+              <a:t>Considerações Finais</a:t>
+            </a:r>
+            <a:endParaRPr lang="pt-BR" sz="3600" b="1" dirty="0">
+              <a:latin typeface="Lucida Sans" pitchFamily="34" charset="0"/>
+              <a:cs typeface="Lucida Sans" pitchFamily="34" charset="0"/>
+            </a:endParaRPr>
+          </a:p>
+        </p:txBody>
+      </p:sp>
+      <p:sp>
+        <p:nvSpPr>
+          <p:cNvPr id="4" name="Retângulo 3"/>
+          <p:cNvSpPr/>
+          <p:nvPr/>
+        </p:nvSpPr>
+        <p:spPr>
+          <a:xfrm>
+            <a:off x="827584" y="1484784"/>
+            <a:ext cx="971741" cy="338554"/>
+          </a:xfrm>
+          <a:prstGeom prst="rect">
+            <a:avLst/>
+          </a:prstGeom>
+        </p:spPr>
+        <p:txBody>
+          <a:bodyPr wrap="none">
+            <a:spAutoFit/>
+          </a:bodyPr>
+          <a:lstStyle/>
+          <a:p>
+            <a:r>
+              <a:rPr lang="pt-BR" b="1" dirty="0" smtClean="0"/>
+              <a:t>Consulta</a:t>
+            </a:r>
+            <a:endParaRPr lang="pt-BR" b="1" dirty="0"/>
+          </a:p>
+        </p:txBody>
+      </p:sp>
+      <p:pic>
+        <p:nvPicPr>
+          <p:cNvPr id="1027" name="Picture 3"/>
+          <p:cNvPicPr>
+            <a:picLocks noChangeAspect="1" noChangeArrowheads="1"/>
+          </p:cNvPicPr>
+          <p:nvPr/>
+        </p:nvPicPr>
+        <p:blipFill>
+          <a:blip r:embed="rId2" cstate="print"/>
+          <a:srcRect/>
+          <a:stretch>
+            <a:fillRect/>
+          </a:stretch>
+        </p:blipFill>
+        <p:spPr bwMode="auto">
+          <a:xfrm>
+            <a:off x="683568" y="2348880"/>
+            <a:ext cx="7869443" cy="2448271"/>
+          </a:xfrm>
+          <a:prstGeom prst="rect">
+            <a:avLst/>
+          </a:prstGeom>
+          <a:noFill/>
+          <a:ln w="9525">
+            <a:noFill/>
+            <a:miter lim="800000"/>
+            <a:headEnd/>
+            <a:tailEnd/>
+          </a:ln>
+        </p:spPr>
+      </p:pic>
+      <p:sp>
+        <p:nvSpPr>
+          <p:cNvPr id="8" name="Retângulo 7"/>
+          <p:cNvSpPr/>
+          <p:nvPr/>
+        </p:nvSpPr>
+        <p:spPr>
+          <a:xfrm>
+            <a:off x="611560" y="4869160"/>
+            <a:ext cx="7200800" cy="584775"/>
+          </a:xfrm>
+          <a:prstGeom prst="rect">
+            <a:avLst/>
+          </a:prstGeom>
+        </p:spPr>
+        <p:txBody>
+          <a:bodyPr wrap="square">
+            <a:spAutoFit/>
+          </a:bodyPr>
+          <a:lstStyle/>
+          <a:p>
+            <a:r>
+              <a:rPr lang="pt-BR" b="1" dirty="0" smtClean="0"/>
+              <a:t>Após escolha da </a:t>
+            </a:r>
+            <a:r>
+              <a:rPr lang="pt-BR" b="1" dirty="0" smtClean="0"/>
+              <a:t>turma, </a:t>
+            </a:r>
+            <a:r>
+              <a:rPr lang="pt-BR" b="1" dirty="0" smtClean="0"/>
+              <a:t>os períodos já lançados estarão disponíveis pra pesquisa. Selecionando uma  </a:t>
+            </a:r>
+            <a:r>
+              <a:rPr lang="pt-BR" b="1" dirty="0" smtClean="0"/>
+              <a:t>data, </a:t>
+            </a:r>
+            <a:r>
+              <a:rPr lang="pt-BR" b="1" dirty="0" smtClean="0"/>
+              <a:t>o sistema trará os registros correspondentes.</a:t>
+            </a:r>
+            <a:endParaRPr lang="pt-BR" b="1" dirty="0"/>
+          </a:p>
+        </p:txBody>
+      </p:sp>
+      <p:sp>
+        <p:nvSpPr>
+          <p:cNvPr id="1028" name="Rectangle 4"/>
+          <p:cNvSpPr>
+            <a:spLocks noChangeArrowheads="1"/>
+          </p:cNvSpPr>
+          <p:nvPr/>
+        </p:nvSpPr>
+        <p:spPr bwMode="auto">
+          <a:xfrm>
+            <a:off x="0" y="0"/>
+            <a:ext cx="9144000" cy="457200"/>
+          </a:xfrm>
+          <a:prstGeom prst="rect">
+            <a:avLst/>
+          </a:prstGeom>
+          <a:noFill/>
+          <a:ln w="9525">
+            <a:noFill/>
+            <a:miter lim="800000"/>
+            <a:headEnd/>
+            <a:tailEnd/>
+          </a:ln>
+          <a:effectLst/>
+        </p:spPr>
+        <p:txBody>
+          <a:bodyPr vert="horz" wrap="none" lIns="91440" tIns="45720" rIns="91440" bIns="45720" numCol="1" anchor="ctr" anchorCtr="0" compatLnSpc="1">
+            <a:prstTxWarp prst="textNoShape">
+              <a:avLst/>
+            </a:prstTxWarp>
+            <a:spAutoFit/>
+          </a:bodyPr>
+          <a:lstStyle/>
+          <a:p>
+            <a:pPr marL="0" marR="0" lvl="0" indent="0" algn="l" defTabSz="914400" rtl="0" eaLnBrk="1" fontAlgn="base" latinLnBrk="0" hangingPunct="1">
+              <a:lnSpc>
+                <a:spcPct val="100000"/>
+              </a:lnSpc>
+              <a:spcBef>
+                <a:spcPct val="0"/>
+              </a:spcBef>
+              <a:spcAft>
+                <a:spcPct val="0"/>
+              </a:spcAft>
+              <a:buClrTx/>
+              <a:buSzTx/>
+              <a:buFontTx/>
+              <a:buNone/>
+              <a:tabLst/>
+            </a:pPr>
+            <a:r>
+              <a:rPr kumimoji="0" lang="pt-BR" sz="1100" b="0" i="0" u="none" strike="noStrike" cap="none" normalizeH="0" baseline="0" smtClean="0">
+                <a:ln>
+                  <a:noFill/>
+                </a:ln>
+                <a:solidFill>
+                  <a:srgbClr val="FF0000"/>
+                </a:solidFill>
+                <a:effectLst/>
+                <a:latin typeface="Calibri" pitchFamily="34" charset="0"/>
+                <a:ea typeface="Calibri" pitchFamily="34" charset="0"/>
+                <a:cs typeface="Times New Roman" pitchFamily="18" charset="0"/>
+              </a:rPr>
+              <a:t>*Todos os campos são necessários para efetuar a consulta.</a:t>
+            </a:r>
+            <a:endParaRPr kumimoji="0" lang="pt-BR" sz="1800" b="0" i="0" u="none" strike="noStrike" cap="none" normalizeH="0" baseline="0" smtClean="0">
+              <a:ln>
+                <a:noFill/>
+              </a:ln>
+              <a:solidFill>
+                <a:schemeClr val="tx1"/>
+              </a:solidFill>
+              <a:effectLst/>
+              <a:latin typeface="Arial" pitchFamily="34" charset="0"/>
+              <a:cs typeface="Arial" pitchFamily="34" charset="0"/>
+            </a:endParaRPr>
+          </a:p>
+        </p:txBody>
+      </p:sp>
+      <p:sp>
+        <p:nvSpPr>
+          <p:cNvPr id="1029" name="Rectangle 5"/>
+          <p:cNvSpPr>
+            <a:spLocks noChangeArrowheads="1"/>
+          </p:cNvSpPr>
+          <p:nvPr/>
+        </p:nvSpPr>
+        <p:spPr bwMode="auto">
+          <a:xfrm>
+            <a:off x="611560" y="1878360"/>
+            <a:ext cx="7272808" cy="338554"/>
+          </a:xfrm>
+          <a:prstGeom prst="rect">
+            <a:avLst/>
+          </a:prstGeom>
+          <a:noFill/>
+          <a:ln w="9525">
+            <a:noFill/>
+            <a:miter lim="800000"/>
+            <a:headEnd/>
+            <a:tailEnd/>
+          </a:ln>
+          <a:effectLst/>
+        </p:spPr>
+        <p:txBody>
+          <a:bodyPr vert="horz" wrap="square" lIns="91440" tIns="45720" rIns="91440" bIns="45720" numCol="1" anchor="ctr" anchorCtr="0" compatLnSpc="1">
+            <a:prstTxWarp prst="textNoShape">
+              <a:avLst/>
+            </a:prstTxWarp>
+            <a:spAutoFit/>
+          </a:bodyPr>
+          <a:lstStyle/>
+          <a:p>
+            <a:pPr marL="0" marR="0" lvl="0" indent="0" algn="l" defTabSz="914400" rtl="0" eaLnBrk="1" fontAlgn="base" latinLnBrk="0" hangingPunct="1">
+              <a:lnSpc>
+                <a:spcPct val="100000"/>
+              </a:lnSpc>
+              <a:spcBef>
+                <a:spcPct val="0"/>
+              </a:spcBef>
+              <a:spcAft>
+                <a:spcPct val="0"/>
+              </a:spcAft>
+              <a:buClrTx/>
+              <a:buSzTx/>
+              <a:buFontTx/>
+              <a:buNone/>
+              <a:tabLst/>
+            </a:pPr>
+            <a:r>
+              <a:rPr kumimoji="0" lang="pt-BR" sz="1600" b="1" i="0" u="none" strike="noStrike" cap="none" normalizeH="0" baseline="0" dirty="0" smtClean="0">
+                <a:ln>
+                  <a:noFill/>
+                </a:ln>
+                <a:solidFill>
+                  <a:srgbClr val="FF0000"/>
+                </a:solidFill>
+                <a:effectLst/>
+                <a:latin typeface="Calibri" pitchFamily="34" charset="0"/>
+                <a:ea typeface="Calibri" pitchFamily="34" charset="0"/>
+                <a:cs typeface="Times New Roman" pitchFamily="18" charset="0"/>
+              </a:rPr>
+              <a:t>*Todos os campos são necessários para efetuar a consulta</a:t>
+            </a:r>
+            <a:r>
+              <a:rPr kumimoji="0" lang="pt-BR" sz="1100" b="0" i="0" u="none" strike="noStrike" cap="none" normalizeH="0" baseline="0" dirty="0" smtClean="0">
+                <a:ln>
+                  <a:noFill/>
+                </a:ln>
+                <a:solidFill>
+                  <a:srgbClr val="FF0000"/>
+                </a:solidFill>
+                <a:effectLst/>
+                <a:latin typeface="Calibri" pitchFamily="34" charset="0"/>
+                <a:ea typeface="Calibri" pitchFamily="34" charset="0"/>
+                <a:cs typeface="Times New Roman" pitchFamily="18" charset="0"/>
+              </a:rPr>
+              <a:t>.</a:t>
+            </a:r>
+            <a:endParaRPr kumimoji="0" lang="pt-BR" sz="1800" b="0" i="0" u="none" strike="noStrike" cap="none" normalizeH="0" baseline="0" dirty="0" smtClean="0">
+              <a:ln>
+                <a:noFill/>
+              </a:ln>
+              <a:solidFill>
+                <a:schemeClr val="tx1"/>
+              </a:solidFill>
+              <a:effectLst/>
+              <a:latin typeface="Arial" pitchFamily="34" charset="0"/>
+              <a:cs typeface="Arial" pitchFamily="34" charset="0"/>
+            </a:endParaRPr>
+          </a:p>
+        </p:txBody>
+      </p:sp>
+    </p:spTree>
+  </p:cSld>
+  <p:clrMapOvr>
+    <a:masterClrMapping/>
+  </p:clrMapOvr>
+</p:sld>
+</file>
+
+<file path=ppt/slides/slide16.xml><?xml version="1.0" encoding="utf-8"?>
+<p:sld xmlns:a="http://schemas.openxmlformats.org/drawingml/2006/main" xmlns:r="http://schemas.openxmlformats.org/officeDocument/2006/relationships" xmlns:p="http://schemas.openxmlformats.org/presentationml/2006/main">
+  <p:cSld>
+    <p:spTree>
+      <p:nvGrpSpPr>
+        <p:cNvPr id="1" name=""/>
+        <p:cNvGrpSpPr/>
+        <p:nvPr/>
+      </p:nvGrpSpPr>
+      <p:grpSpPr>
+        <a:xfrm>
+          <a:off x="0" y="0"/>
+          <a:ext cx="0" cy="0"/>
+          <a:chOff x="0" y="0"/>
+          <a:chExt cx="0" cy="0"/>
+        </a:xfrm>
+      </p:grpSpPr>
+      <p:sp>
+        <p:nvSpPr>
           <p:cNvPr id="2" name="Retângulo 1"/>
           <p:cNvSpPr/>
           <p:nvPr/>
@@ -4552,7 +4854,7 @@
     </p:spTree>
     <p:extLst>
       <p:ext uri="{BB962C8B-B14F-4D97-AF65-F5344CB8AC3E}">
-        <p14:creationId xmlns:p14="http://schemas.microsoft.com/office/powerpoint/2010/main" xmlns="" val="1311009085"/>
+        <p14:creationId xmlns="" xmlns:p14="http://schemas.microsoft.com/office/powerpoint/2010/main" val="1311009085"/>
       </p:ext>
     </p:extLst>
   </p:cSld>
@@ -4608,14 +4910,14 @@
           </a:ln>
           <a:extLst>
             <a:ext uri="{909E8E84-426E-40DD-AFC4-6F175D3DCCD1}">
-              <a14:hiddenFill xmlns:a14="http://schemas.microsoft.com/office/drawing/2010/main" xmlns="">
+              <a14:hiddenFill xmlns="" xmlns:a14="http://schemas.microsoft.com/office/drawing/2010/main">
                 <a:solidFill>
                   <a:srgbClr val="FFFFFF"/>
                 </a:solidFill>
               </a14:hiddenFill>
             </a:ext>
             <a:ext uri="{91240B29-F687-4F45-9708-019B960494DF}">
-              <a14:hiddenLine xmlns:a14="http://schemas.microsoft.com/office/drawing/2010/main" xmlns="" w="9525">
+              <a14:hiddenLine xmlns="" xmlns:a14="http://schemas.microsoft.com/office/drawing/2010/main" w="9525">
                 <a:solidFill>
                   <a:srgbClr val="000000"/>
                 </a:solidFill>
@@ -4834,13 +5136,7 @@
               <a:rPr lang="pt-BR" sz="3200" b="1" baseline="0" dirty="0" smtClean="0">
                 <a:latin typeface="Calibri" pitchFamily="34" charset="0"/>
               </a:rPr>
-              <a:t>Informar RA do GDAE</a:t>
-            </a:r>
-            <a:r>
-              <a:rPr lang="pt-BR" sz="3200" b="1" baseline="0" dirty="0" smtClean="0">
-                <a:latin typeface="Calibri" pitchFamily="34" charset="0"/>
-              </a:rPr>
-              <a:t>.</a:t>
+              <a:t>Informar RA do GDAE.</a:t>
             </a:r>
           </a:p>
           <a:p>
@@ -4874,9 +5170,6 @@
               </a:rPr>
               <a:t>Considerações Finais</a:t>
             </a:r>
-            <a:endParaRPr lang="pt-BR" sz="3200" b="1" baseline="0" dirty="0" smtClean="0">
-              <a:latin typeface="Calibri" pitchFamily="34" charset="0"/>
-            </a:endParaRPr>
           </a:p>
           <a:p>
             <a:pPr marL="0" lvl="1" algn="ctr">
@@ -4947,14 +5240,14 @@
           </a:ln>
           <a:extLst>
             <a:ext uri="{909E8E84-426E-40DD-AFC4-6F175D3DCCD1}">
-              <a14:hiddenFill xmlns:a14="http://schemas.microsoft.com/office/drawing/2010/main" xmlns="">
+              <a14:hiddenFill xmlns="" xmlns:a14="http://schemas.microsoft.com/office/drawing/2010/main">
                 <a:solidFill>
                   <a:srgbClr val="FFFFFF"/>
                 </a:solidFill>
               </a14:hiddenFill>
             </a:ext>
             <a:ext uri="{91240B29-F687-4F45-9708-019B960494DF}">
-              <a14:hiddenLine xmlns:a14="http://schemas.microsoft.com/office/drawing/2010/main" xmlns="" w="9525">
+              <a14:hiddenLine xmlns="" xmlns:a14="http://schemas.microsoft.com/office/drawing/2010/main" w="9525">
                 <a:solidFill>
                   <a:srgbClr val="000000"/>
                 </a:solidFill>
@@ -5183,7 +5476,7 @@
     </p:spTree>
     <p:extLst>
       <p:ext uri="{BB962C8B-B14F-4D97-AF65-F5344CB8AC3E}">
-        <p14:creationId xmlns:p14="http://schemas.microsoft.com/office/powerpoint/2010/main" xmlns="" val="3152063489"/>
+        <p14:creationId xmlns="" xmlns:p14="http://schemas.microsoft.com/office/powerpoint/2010/main" val="3152063489"/>
       </p:ext>
     </p:extLst>
   </p:cSld>
@@ -5239,14 +5532,14 @@
           </a:ln>
           <a:extLst>
             <a:ext uri="{909E8E84-426E-40DD-AFC4-6F175D3DCCD1}">
-              <a14:hiddenFill xmlns:a14="http://schemas.microsoft.com/office/drawing/2010/main" xmlns="">
+              <a14:hiddenFill xmlns="" xmlns:a14="http://schemas.microsoft.com/office/drawing/2010/main">
                 <a:solidFill>
                   <a:srgbClr val="FFFFFF"/>
                 </a:solidFill>
               </a14:hiddenFill>
             </a:ext>
             <a:ext uri="{91240B29-F687-4F45-9708-019B960494DF}">
-              <a14:hiddenLine xmlns:a14="http://schemas.microsoft.com/office/drawing/2010/main" xmlns="" w="9525">
+              <a14:hiddenLine xmlns="" xmlns:a14="http://schemas.microsoft.com/office/drawing/2010/main" w="9525">
                 <a:solidFill>
                   <a:srgbClr val="000000"/>
                 </a:solidFill>
@@ -5561,7 +5854,7 @@
     </p:spTree>
     <p:extLst>
       <p:ext uri="{BB962C8B-B14F-4D97-AF65-F5344CB8AC3E}">
-        <p14:creationId xmlns:p14="http://schemas.microsoft.com/office/powerpoint/2010/main" xmlns="" val="4099111165"/>
+        <p14:creationId xmlns="" xmlns:p14="http://schemas.microsoft.com/office/powerpoint/2010/main" val="4099111165"/>
       </p:ext>
     </p:extLst>
   </p:cSld>
@@ -5617,14 +5910,14 @@
           </a:ln>
           <a:extLst>
             <a:ext uri="{909E8E84-426E-40DD-AFC4-6F175D3DCCD1}">
-              <a14:hiddenFill xmlns:a14="http://schemas.microsoft.com/office/drawing/2010/main" xmlns="">
+              <a14:hiddenFill xmlns="" xmlns:a14="http://schemas.microsoft.com/office/drawing/2010/main">
                 <a:solidFill>
                   <a:srgbClr val="FFFFFF"/>
                 </a:solidFill>
               </a14:hiddenFill>
             </a:ext>
             <a:ext uri="{91240B29-F687-4F45-9708-019B960494DF}">
-              <a14:hiddenLine xmlns:a14="http://schemas.microsoft.com/office/drawing/2010/main" xmlns="" w="9525">
+              <a14:hiddenLine xmlns="" xmlns:a14="http://schemas.microsoft.com/office/drawing/2010/main" w="9525">
                 <a:solidFill>
                   <a:srgbClr val="000000"/>
                 </a:solidFill>
@@ -5914,14 +6207,14 @@
           </a:ln>
           <a:extLst>
             <a:ext uri="{909E8E84-426E-40DD-AFC4-6F175D3DCCD1}">
-              <a14:hiddenFill xmlns:a14="http://schemas.microsoft.com/office/drawing/2010/main" xmlns="">
+              <a14:hiddenFill xmlns="" xmlns:a14="http://schemas.microsoft.com/office/drawing/2010/main">
                 <a:solidFill>
                   <a:srgbClr val="FFFFFF"/>
                 </a:solidFill>
               </a14:hiddenFill>
             </a:ext>
             <a:ext uri="{91240B29-F687-4F45-9708-019B960494DF}">
-              <a14:hiddenLine xmlns:a14="http://schemas.microsoft.com/office/drawing/2010/main" xmlns="" w="9525">
+              <a14:hiddenLine xmlns="" xmlns:a14="http://schemas.microsoft.com/office/drawing/2010/main" w="9525">
                 <a:solidFill>
                   <a:srgbClr val="000000"/>
                 </a:solidFill>
@@ -6211,14 +6504,14 @@
           </a:ln>
           <a:extLst>
             <a:ext uri="{909E8E84-426E-40DD-AFC4-6F175D3DCCD1}">
-              <a14:hiddenFill xmlns:a14="http://schemas.microsoft.com/office/drawing/2010/main" xmlns="">
+              <a14:hiddenFill xmlns="" xmlns:a14="http://schemas.microsoft.com/office/drawing/2010/main">
                 <a:solidFill>
                   <a:srgbClr val="FFFFFF"/>
                 </a:solidFill>
               </a14:hiddenFill>
             </a:ext>
             <a:ext uri="{91240B29-F687-4F45-9708-019B960494DF}">
-              <a14:hiddenLine xmlns:a14="http://schemas.microsoft.com/office/drawing/2010/main" xmlns="" w="9525">
+              <a14:hiddenLine xmlns="" xmlns:a14="http://schemas.microsoft.com/office/drawing/2010/main" w="9525">
                 <a:solidFill>
                   <a:srgbClr val="000000"/>
                 </a:solidFill>
@@ -6475,14 +6768,14 @@
           </a:ln>
           <a:extLst>
             <a:ext uri="{909E8E84-426E-40DD-AFC4-6F175D3DCCD1}">
-              <a14:hiddenFill xmlns:a14="http://schemas.microsoft.com/office/drawing/2010/main" xmlns="">
+              <a14:hiddenFill xmlns="" xmlns:a14="http://schemas.microsoft.com/office/drawing/2010/main">
                 <a:solidFill>
                   <a:srgbClr val="FFFFFF"/>
                 </a:solidFill>
               </a14:hiddenFill>
             </a:ext>
             <a:ext uri="{91240B29-F687-4F45-9708-019B960494DF}">
-              <a14:hiddenLine xmlns:a14="http://schemas.microsoft.com/office/drawing/2010/main" xmlns="" w="9525">
+              <a14:hiddenLine xmlns="" xmlns:a14="http://schemas.microsoft.com/office/drawing/2010/main" w="9525">
                 <a:solidFill>
                   <a:srgbClr val="000000"/>
                 </a:solidFill>
@@ -6771,14 +7064,14 @@
           </a:ln>
           <a:extLst>
             <a:ext uri="{909E8E84-426E-40DD-AFC4-6F175D3DCCD1}">
-              <a14:hiddenFill xmlns:a14="http://schemas.microsoft.com/office/drawing/2010/main" xmlns="">
+              <a14:hiddenFill xmlns="" xmlns:a14="http://schemas.microsoft.com/office/drawing/2010/main">
                 <a:solidFill>
                   <a:srgbClr val="FFFFFF"/>
                 </a:solidFill>
               </a14:hiddenFill>
             </a:ext>
             <a:ext uri="{91240B29-F687-4F45-9708-019B960494DF}">
-              <a14:hiddenLine xmlns:a14="http://schemas.microsoft.com/office/drawing/2010/main" xmlns="" w="9525">
+              <a14:hiddenLine xmlns="" xmlns:a14="http://schemas.microsoft.com/office/drawing/2010/main" w="9525">
                 <a:solidFill>
                   <a:srgbClr val="000000"/>
                 </a:solidFill>
@@ -7269,7 +7562,7 @@
   <a:extraClrSchemeLst/>
   <a:extLst>
     <a:ext uri="{05A4C25C-085E-4340-85A3-A5531E510DB2}">
-      <thm15:themeFamily xmlns:thm15="http://schemas.microsoft.com/office/thememl/2012/main" xmlns="" name="Office Theme" id="{62F939B6-93AF-4DB8-9C6B-D6C7DFDC589F}" vid="{4A3C46E8-61CC-4603-A589-7422A47A8E4A}"/>
+      <thm15:themeFamily xmlns="" xmlns:thm15="http://schemas.microsoft.com/office/thememl/2012/main" name="Office Theme" id="{62F939B6-93AF-4DB8-9C6B-D6C7DFDC589F}" vid="{4A3C46E8-61CC-4603-A589-7422A47A8E4A}"/>
     </a:ext>
   </a:extLst>
 </a:theme>

</xml_diff>